<commit_message>
Slight modification to presentation
</commit_message>
<xml_diff>
--- a/presentation/TraceRoute.pptx
+++ b/presentation/TraceRoute.pptx
@@ -124,6 +124,9 @@
         </p14:section>
       </p14:sectionLst>
     </p:ext>
+    <p:ext uri="{EFAFB233-063F-42B5-8137-9DF3F51BA10A}">
+      <p15:sldGuideLst xmlns:p15="http://schemas.microsoft.com/office/powerpoint/2012/main"/>
+    </p:ext>
   </p:extLst>
 </p:presentation>
 </file>
@@ -314,7 +317,7 @@
           <a:p>
             <a:fld id="{4AAD347D-5ACD-4C99-B74B-A9C85AD731AF}" type="datetimeFigureOut">
               <a:rPr lang="en-US" smtClean="0"/>
-              <a:t>6/2/2015</a:t>
+              <a:t>6/7/2015</a:t>
             </a:fld>
             <a:endParaRPr lang="en-US" dirty="0"/>
           </a:p>
@@ -589,7 +592,7 @@
           <a:p>
             <a:fld id="{4509A250-FF31-4206-8172-F9D3106AACB1}" type="datetimeFigureOut">
               <a:rPr lang="en-US" smtClean="0"/>
-              <a:t>6/2/2015</a:t>
+              <a:t>6/7/2015</a:t>
             </a:fld>
             <a:endParaRPr lang="en-US" dirty="0"/>
           </a:p>
@@ -783,7 +786,7 @@
           <a:p>
             <a:fld id="{4509A250-FF31-4206-8172-F9D3106AACB1}" type="datetimeFigureOut">
               <a:rPr lang="en-US" smtClean="0"/>
-              <a:t>6/2/2015</a:t>
+              <a:t>6/7/2015</a:t>
             </a:fld>
             <a:endParaRPr lang="en-US" dirty="0"/>
           </a:p>
@@ -1054,7 +1057,7 @@
           <a:p>
             <a:fld id="{4509A250-FF31-4206-8172-F9D3106AACB1}" type="datetimeFigureOut">
               <a:rPr lang="en-US" smtClean="0"/>
-              <a:t>6/2/2015</a:t>
+              <a:t>6/7/2015</a:t>
             </a:fld>
             <a:endParaRPr lang="en-US" dirty="0"/>
           </a:p>
@@ -1381,7 +1384,7 @@
           <a:p>
             <a:fld id="{4509A250-FF31-4206-8172-F9D3106AACB1}" type="datetimeFigureOut">
               <a:rPr lang="en-US" smtClean="0"/>
-              <a:t>6/2/2015</a:t>
+              <a:t>6/7/2015</a:t>
             </a:fld>
             <a:endParaRPr lang="en-US" dirty="0"/>
           </a:p>
@@ -2000,7 +2003,7 @@
           <a:p>
             <a:fld id="{4509A250-FF31-4206-8172-F9D3106AACB1}" type="datetimeFigureOut">
               <a:rPr lang="en-US" smtClean="0"/>
-              <a:t>6/2/2015</a:t>
+              <a:t>6/7/2015</a:t>
             </a:fld>
             <a:endParaRPr lang="en-US" dirty="0"/>
           </a:p>
@@ -2847,7 +2850,7 @@
           <a:p>
             <a:fld id="{4509A250-FF31-4206-8172-F9D3106AACB1}" type="datetimeFigureOut">
               <a:rPr lang="en-US" smtClean="0"/>
-              <a:t>6/2/2015</a:t>
+              <a:t>6/7/2015</a:t>
             </a:fld>
             <a:endParaRPr lang="en-US" dirty="0"/>
           </a:p>
@@ -3017,7 +3020,7 @@
           <a:p>
             <a:fld id="{4509A250-FF31-4206-8172-F9D3106AACB1}" type="datetimeFigureOut">
               <a:rPr lang="en-US" smtClean="0"/>
-              <a:t>6/2/2015</a:t>
+              <a:t>6/7/2015</a:t>
             </a:fld>
             <a:endParaRPr lang="en-US" dirty="0"/>
           </a:p>
@@ -3197,7 +3200,7 @@
           <a:p>
             <a:fld id="{4509A250-FF31-4206-8172-F9D3106AACB1}" type="datetimeFigureOut">
               <a:rPr lang="en-US" smtClean="0"/>
-              <a:t>6/2/2015</a:t>
+              <a:t>6/7/2015</a:t>
             </a:fld>
             <a:endParaRPr lang="en-US" dirty="0"/>
           </a:p>
@@ -3367,7 +3370,7 @@
           <a:p>
             <a:fld id="{4509A250-FF31-4206-8172-F9D3106AACB1}" type="datetimeFigureOut">
               <a:rPr lang="en-US" smtClean="0"/>
-              <a:t>6/2/2015</a:t>
+              <a:t>6/7/2015</a:t>
             </a:fld>
             <a:endParaRPr lang="en-US" dirty="0"/>
           </a:p>
@@ -3614,7 +3617,7 @@
           <a:p>
             <a:fld id="{9796027F-7875-4030-9381-8BD8C4F21935}" type="datetimeFigureOut">
               <a:rPr lang="en-US" smtClean="0"/>
-              <a:t>6/2/2015</a:t>
+              <a:t>6/7/2015</a:t>
             </a:fld>
             <a:endParaRPr lang="en-US" dirty="0"/>
           </a:p>
@@ -3906,7 +3909,7 @@
           <a:p>
             <a:fld id="{9796027F-7875-4030-9381-8BD8C4F21935}" type="datetimeFigureOut">
               <a:rPr lang="en-US" smtClean="0"/>
-              <a:t>6/2/2015</a:t>
+              <a:t>6/7/2015</a:t>
             </a:fld>
             <a:endParaRPr lang="en-US" dirty="0"/>
           </a:p>
@@ -4350,7 +4353,7 @@
           <a:p>
             <a:fld id="{9796027F-7875-4030-9381-8BD8C4F21935}" type="datetimeFigureOut">
               <a:rPr lang="en-US" smtClean="0"/>
-              <a:t>6/2/2015</a:t>
+              <a:t>6/7/2015</a:t>
             </a:fld>
             <a:endParaRPr lang="en-US" dirty="0"/>
           </a:p>
@@ -4468,7 +4471,7 @@
           <a:p>
             <a:fld id="{4509A250-FF31-4206-8172-F9D3106AACB1}" type="datetimeFigureOut">
               <a:rPr lang="en-US" smtClean="0"/>
-              <a:t>6/2/2015</a:t>
+              <a:t>6/7/2015</a:t>
             </a:fld>
             <a:endParaRPr lang="en-US" dirty="0"/>
           </a:p>
@@ -4563,7 +4566,7 @@
           <a:p>
             <a:fld id="{4509A250-FF31-4206-8172-F9D3106AACB1}" type="datetimeFigureOut">
               <a:rPr lang="en-US" smtClean="0"/>
-              <a:t>6/2/2015</a:t>
+              <a:t>6/7/2015</a:t>
             </a:fld>
             <a:endParaRPr lang="en-US" dirty="0"/>
           </a:p>
@@ -4842,7 +4845,7 @@
           <a:p>
             <a:fld id="{4509A250-FF31-4206-8172-F9D3106AACB1}" type="datetimeFigureOut">
               <a:rPr lang="en-US" smtClean="0"/>
-              <a:t>6/2/2015</a:t>
+              <a:t>6/7/2015</a:t>
             </a:fld>
             <a:endParaRPr lang="en-US" dirty="0"/>
           </a:p>
@@ -5117,7 +5120,7 @@
           <a:p>
             <a:fld id="{4509A250-FF31-4206-8172-F9D3106AACB1}" type="datetimeFigureOut">
               <a:rPr lang="en-US" smtClean="0"/>
-              <a:t>6/2/2015</a:t>
+              <a:t>6/7/2015</a:t>
             </a:fld>
             <a:endParaRPr lang="en-US" dirty="0"/>
           </a:p>
@@ -5540,7 +5543,7 @@
           <a:p>
             <a:fld id="{4AAD347D-5ACD-4C99-B74B-A9C85AD731AF}" type="datetimeFigureOut">
               <a:rPr lang="en-US" smtClean="0"/>
-              <a:t>6/2/2015</a:t>
+              <a:t>6/7/2015</a:t>
             </a:fld>
             <a:endParaRPr lang="en-US" dirty="0"/>
           </a:p>
@@ -6711,7 +6714,12 @@
             <p:ph type="title"/>
           </p:nvPr>
         </p:nvSpPr>
-        <p:spPr/>
+        <p:spPr>
+          <a:xfrm>
+            <a:off x="645130" y="452718"/>
+            <a:ext cx="9404723" cy="1400530"/>
+          </a:xfrm>
+        </p:spPr>
         <p:txBody>
           <a:bodyPr/>
           <a:lstStyle/>
@@ -6739,7 +6747,29 @@
           <a:bodyPr/>
           <a:lstStyle/>
           <a:p>
-            <a:endParaRPr lang="en-US"/>
+            <a:r>
+              <a:rPr lang="en-US" dirty="0" smtClean="0"/>
+              <a:t>Lots of math!</a:t>
+            </a:r>
+          </a:p>
+          <a:p>
+            <a:r>
+              <a:rPr lang="en-US" dirty="0" smtClean="0"/>
+              <a:t>Clumsy API – OpenGL ES</a:t>
+            </a:r>
+          </a:p>
+          <a:p>
+            <a:r>
+              <a:rPr lang="en-US" dirty="0" smtClean="0"/>
+              <a:t>Things that are intuitive from a user perspective (camera control, lighting) are fairly involved processes.</a:t>
+            </a:r>
+            <a:endParaRPr lang="en-US" dirty="0" smtClean="0"/>
+          </a:p>
+          <a:p>
+            <a:pPr marL="0" indent="0">
+              <a:buNone/>
+            </a:pPr>
+            <a:endParaRPr lang="en-US" dirty="0"/>
           </a:p>
         </p:txBody>
       </p:sp>

</xml_diff>